<commit_message>
Finish CSS for FeedTop
</commit_message>
<xml_diff>
--- a/Twitter Clone.pptx
+++ b/Twitter Clone.pptx
@@ -27,10 +27,10 @@
     <p:sldId id="279" r:id="rId21"/>
     <p:sldId id="280" r:id="rId22"/>
     <p:sldId id="281" r:id="rId23"/>
-    <p:sldId id="284" r:id="rId24"/>
-    <p:sldId id="285" r:id="rId25"/>
-    <p:sldId id="286" r:id="rId26"/>
-    <p:sldId id="287" r:id="rId27"/>
+    <p:sldId id="287" r:id="rId24"/>
+    <p:sldId id="284" r:id="rId25"/>
+    <p:sldId id="285" r:id="rId26"/>
+    <p:sldId id="286" r:id="rId27"/>
     <p:sldId id="288" r:id="rId28"/>
     <p:sldId id="282" r:id="rId29"/>
     <p:sldId id="283" r:id="rId30"/>
@@ -168,10 +168,10 @@
             <p14:sldId id="279"/>
             <p14:sldId id="280"/>
             <p14:sldId id="281"/>
+            <p14:sldId id="287"/>
             <p14:sldId id="284"/>
             <p14:sldId id="285"/>
             <p14:sldId id="286"/>
-            <p14:sldId id="287"/>
             <p14:sldId id="288"/>
             <p14:sldId id="282"/>
             <p14:sldId id="283"/>
@@ -204,7 +204,7 @@
   <pc:docChgLst>
     <pc:chgData name="Matt Burns" userId="a4ff0c107545f849" providerId="LiveId" clId="{8892E39A-8B6A-49A3-908D-D8571AC1E7B7}"/>
     <pc:docChg chg="undo custSel addSld delSld modSld sldOrd modSection">
-      <pc:chgData name="Matt Burns" userId="a4ff0c107545f849" providerId="LiveId" clId="{8892E39A-8B6A-49A3-908D-D8571AC1E7B7}" dt="2023-03-13T15:56:12.158" v="2093" actId="26606"/>
+      <pc:chgData name="Matt Burns" userId="a4ff0c107545f849" providerId="LiveId" clId="{8892E39A-8B6A-49A3-908D-D8571AC1E7B7}" dt="2023-03-15T17:50:02.681" v="2095"/>
       <pc:docMkLst>
         <pc:docMk/>
       </pc:docMkLst>
@@ -1691,8 +1691,8 @@
           </ac:picMkLst>
         </pc:picChg>
       </pc:sldChg>
-      <pc:sldChg chg="addSp delSp modSp new mod">
-        <pc:chgData name="Matt Burns" userId="a4ff0c107545f849" providerId="LiveId" clId="{8892E39A-8B6A-49A3-908D-D8571AC1E7B7}" dt="2023-03-13T15:48:45.204" v="1824" actId="20577"/>
+      <pc:sldChg chg="addSp delSp modSp new mod ord">
+        <pc:chgData name="Matt Burns" userId="a4ff0c107545f849" providerId="LiveId" clId="{8892E39A-8B6A-49A3-908D-D8571AC1E7B7}" dt="2023-03-15T17:50:02.681" v="2095"/>
         <pc:sldMkLst>
           <pc:docMk/>
           <pc:sldMk cId="3531458181" sldId="287"/>
@@ -2228,7 +2228,7 @@
           <a:p>
             <a:fld id="{92538219-6E45-4D12-B767-46F92D5844D4}" type="datetime1">
               <a:rPr lang="en-US" smtClean="0"/>
-              <a:t>3/13/2023</a:t>
+              <a:t>3/15/2023</a:t>
             </a:fld>
             <a:endParaRPr lang="en-US"/>
           </a:p>
@@ -2426,7 +2426,7 @@
           <a:p>
             <a:fld id="{836430B8-6059-41E5-A5DC-C07A76F5859A}" type="datetime1">
               <a:rPr lang="en-US" smtClean="0"/>
-              <a:t>3/13/2023</a:t>
+              <a:t>3/15/2023</a:t>
             </a:fld>
             <a:endParaRPr lang="en-US"/>
           </a:p>
@@ -2688,7 +2688,7 @@
           <a:p>
             <a:fld id="{A09D0CB7-D16E-4358-B7F4-EA4A24554592}" type="datetime1">
               <a:rPr lang="en-US" smtClean="0"/>
-              <a:t>3/13/2023</a:t>
+              <a:t>3/15/2023</a:t>
             </a:fld>
             <a:endParaRPr lang="en-US"/>
           </a:p>
@@ -2904,7 +2904,7 @@
           <a:p>
             <a:fld id="{8BB296A2-D8F0-4E17-BFD0-A6C902250D59}" type="datetime1">
               <a:rPr lang="en-US" smtClean="0"/>
-              <a:t>3/13/2023</a:t>
+              <a:t>3/15/2023</a:t>
             </a:fld>
             <a:endParaRPr lang="en-US"/>
           </a:p>
@@ -3234,7 +3234,7 @@
           <a:p>
             <a:fld id="{D9108C9C-1ACB-4C84-A002-C7E0E45B937A}" type="datetime1">
               <a:rPr lang="en-US" smtClean="0"/>
-              <a:t>3/13/2023</a:t>
+              <a:t>3/15/2023</a:t>
             </a:fld>
             <a:endParaRPr lang="en-US"/>
           </a:p>
@@ -3507,7 +3507,7 @@
           <a:p>
             <a:fld id="{F49AF2A5-B297-4977-9E5B-4D3050E23689}" type="datetime1">
               <a:rPr lang="en-US" smtClean="0"/>
-              <a:t>3/13/2023</a:t>
+              <a:t>3/15/2023</a:t>
             </a:fld>
             <a:endParaRPr lang="en-US"/>
           </a:p>
@@ -3922,7 +3922,7 @@
           <a:p>
             <a:fld id="{70127434-4794-409A-9547-04789BA47588}" type="datetime1">
               <a:rPr lang="en-US" smtClean="0"/>
-              <a:t>3/13/2023</a:t>
+              <a:t>3/15/2023</a:t>
             </a:fld>
             <a:endParaRPr lang="en-US"/>
           </a:p>
@@ -4063,7 +4063,7 @@
           <a:p>
             <a:fld id="{85658635-357A-4E3D-B824-A5CEFDB8449C}" type="datetime1">
               <a:rPr lang="en-US" smtClean="0"/>
-              <a:t>3/13/2023</a:t>
+              <a:t>3/15/2023</a:t>
             </a:fld>
             <a:endParaRPr lang="en-US"/>
           </a:p>
@@ -4176,7 +4176,7 @@
           <a:p>
             <a:fld id="{7E86FF77-2719-4AD0-8740-0B90FF5D1EFB}" type="datetime1">
               <a:rPr lang="en-US" smtClean="0"/>
-              <a:t>3/13/2023</a:t>
+              <a:t>3/15/2023</a:t>
             </a:fld>
             <a:endParaRPr lang="en-US"/>
           </a:p>
@@ -4672,7 +4672,7 @@
           <a:p>
             <a:fld id="{6E441C83-1089-48B9-8B65-293D4C236D35}" type="datetime1">
               <a:rPr lang="en-US" smtClean="0"/>
-              <a:t>3/13/2023</a:t>
+              <a:t>3/15/2023</a:t>
             </a:fld>
             <a:endParaRPr lang="en-US"/>
           </a:p>
@@ -5147,7 +5147,7 @@
           <a:p>
             <a:fld id="{D162FE45-CC1E-47DB-8B82-6CF0636FBDB8}" type="datetime1">
               <a:rPr lang="en-US" smtClean="0"/>
-              <a:t>3/13/2023</a:t>
+              <a:t>3/15/2023</a:t>
             </a:fld>
             <a:endParaRPr lang="en-US"/>
           </a:p>
@@ -5442,7 +5442,7 @@
           <a:p>
             <a:fld id="{51FC8E16-3C03-4238-9C6F-B34F3D10F77E}" type="datetime1">
               <a:rPr lang="en-US" smtClean="0"/>
-              <a:t>3/13/2023</a:t>
+              <a:t>3/15/2023</a:t>
             </a:fld>
             <a:endParaRPr lang="en-US"/>
           </a:p>
@@ -11806,6 +11806,495 @@
           <p:cNvPr id="2" name="Picture 1">
             <a:extLst>
               <a:ext uri="{FF2B5EF4-FFF2-40B4-BE49-F238E27FC236}">
+                <a16:creationId xmlns:a16="http://schemas.microsoft.com/office/drawing/2014/main" id="{06F21E62-7134-D042-9A94-3AA6F9DE5ED8}"/>
+              </a:ext>
+            </a:extLst>
+          </p:cNvPr>
+          <p:cNvPicPr>
+            <a:picLocks noChangeAspect="1"/>
+          </p:cNvPicPr>
+          <p:nvPr/>
+        </p:nvPicPr>
+        <p:blipFill rotWithShape="1">
+          <a:blip r:embed="rId2"/>
+          <a:srcRect b="72054"/>
+          <a:stretch/>
+        </p:blipFill>
+        <p:spPr>
+          <a:xfrm>
+            <a:off x="878486" y="536350"/>
+            <a:ext cx="9867164" cy="2119764"/>
+          </a:xfrm>
+          <a:prstGeom prst="rect">
+            <a:avLst/>
+          </a:prstGeom>
+        </p:spPr>
+      </p:pic>
+      <p:sp>
+        <p:nvSpPr>
+          <p:cNvPr id="3" name="Rectangle 2">
+            <a:extLst>
+              <a:ext uri="{FF2B5EF4-FFF2-40B4-BE49-F238E27FC236}">
+                <a16:creationId xmlns:a16="http://schemas.microsoft.com/office/drawing/2014/main" id="{B0D25E31-B7D9-BC3B-6D03-157FE503CBEB}"/>
+              </a:ext>
+            </a:extLst>
+          </p:cNvPr>
+          <p:cNvSpPr/>
+          <p:nvPr/>
+        </p:nvSpPr>
+        <p:spPr>
+          <a:xfrm>
+            <a:off x="1150071" y="705394"/>
+            <a:ext cx="891606" cy="844732"/>
+          </a:xfrm>
+          <a:prstGeom prst="rect">
+            <a:avLst/>
+          </a:prstGeom>
+          <a:solidFill>
+            <a:schemeClr val="accent2">
+              <a:alpha val="75000"/>
+            </a:schemeClr>
+          </a:solidFill>
+          <a:ln>
+            <a:noFill/>
+          </a:ln>
+        </p:spPr>
+        <p:style>
+          <a:lnRef idx="2">
+            <a:schemeClr val="accent3">
+              <a:shade val="50000"/>
+            </a:schemeClr>
+          </a:lnRef>
+          <a:fillRef idx="1">
+            <a:schemeClr val="accent3"/>
+          </a:fillRef>
+          <a:effectRef idx="0">
+            <a:schemeClr val="accent3"/>
+          </a:effectRef>
+          <a:fontRef idx="minor">
+            <a:schemeClr val="lt1"/>
+          </a:fontRef>
+        </p:style>
+        <p:txBody>
+          <a:bodyPr rtlCol="0" anchor="ctr"/>
+          <a:lstStyle/>
+          <a:p>
+            <a:pPr algn="ctr"/>
+            <a:r>
+              <a:rPr lang="en-US"/>
+              <a:t>TweetProfilePic</a:t>
+            </a:r>
+          </a:p>
+        </p:txBody>
+      </p:sp>
+      <p:sp>
+        <p:nvSpPr>
+          <p:cNvPr id="4" name="Rectangle 3">
+            <a:extLst>
+              <a:ext uri="{FF2B5EF4-FFF2-40B4-BE49-F238E27FC236}">
+                <a16:creationId xmlns:a16="http://schemas.microsoft.com/office/drawing/2014/main" id="{826F883C-00F6-88F1-A88C-A9D7C338A121}"/>
+              </a:ext>
+            </a:extLst>
+          </p:cNvPr>
+          <p:cNvSpPr/>
+          <p:nvPr/>
+        </p:nvSpPr>
+        <p:spPr>
+          <a:xfrm>
+            <a:off x="2041678" y="705393"/>
+            <a:ext cx="8539236" cy="1854927"/>
+          </a:xfrm>
+          <a:prstGeom prst="rect">
+            <a:avLst/>
+          </a:prstGeom>
+          <a:solidFill>
+            <a:schemeClr val="accent2">
+              <a:alpha val="75000"/>
+            </a:schemeClr>
+          </a:solidFill>
+          <a:ln>
+            <a:noFill/>
+          </a:ln>
+        </p:spPr>
+        <p:style>
+          <a:lnRef idx="2">
+            <a:schemeClr val="accent3">
+              <a:shade val="50000"/>
+            </a:schemeClr>
+          </a:lnRef>
+          <a:fillRef idx="1">
+            <a:schemeClr val="accent3"/>
+          </a:fillRef>
+          <a:effectRef idx="0">
+            <a:schemeClr val="accent3"/>
+          </a:effectRef>
+          <a:fontRef idx="minor">
+            <a:schemeClr val="lt1"/>
+          </a:fontRef>
+        </p:style>
+        <p:txBody>
+          <a:bodyPr rtlCol="0" anchor="ctr"/>
+          <a:lstStyle/>
+          <a:p>
+            <a:pPr algn="ctr"/>
+            <a:r>
+              <a:rPr lang="en-US"/>
+              <a:t>TweetRight</a:t>
+            </a:r>
+          </a:p>
+        </p:txBody>
+      </p:sp>
+      <p:pic>
+        <p:nvPicPr>
+          <p:cNvPr id="5" name="Picture 4">
+            <a:extLst>
+              <a:ext uri="{FF2B5EF4-FFF2-40B4-BE49-F238E27FC236}">
+                <a16:creationId xmlns:a16="http://schemas.microsoft.com/office/drawing/2014/main" id="{0DACCA06-C349-1A5F-A7DA-2996A7212478}"/>
+              </a:ext>
+            </a:extLst>
+          </p:cNvPr>
+          <p:cNvPicPr>
+            <a:picLocks noChangeAspect="1"/>
+          </p:cNvPicPr>
+          <p:nvPr/>
+        </p:nvPicPr>
+        <p:blipFill rotWithShape="1">
+          <a:blip r:embed="rId2"/>
+          <a:srcRect l="12624" t="1631" r="3619" b="74144"/>
+          <a:stretch/>
+        </p:blipFill>
+        <p:spPr>
+          <a:xfrm>
+            <a:off x="1665543" y="2943496"/>
+            <a:ext cx="8264434" cy="1837510"/>
+          </a:xfrm>
+          <a:prstGeom prst="rect">
+            <a:avLst/>
+          </a:prstGeom>
+        </p:spPr>
+      </p:pic>
+      <p:sp>
+        <p:nvSpPr>
+          <p:cNvPr id="7" name="Rectangle 6">
+            <a:extLst>
+              <a:ext uri="{FF2B5EF4-FFF2-40B4-BE49-F238E27FC236}">
+                <a16:creationId xmlns:a16="http://schemas.microsoft.com/office/drawing/2014/main" id="{8D1B362A-D50F-D62C-15AF-75284CDDF32E}"/>
+              </a:ext>
+            </a:extLst>
+          </p:cNvPr>
+          <p:cNvSpPr/>
+          <p:nvPr/>
+        </p:nvSpPr>
+        <p:spPr>
+          <a:xfrm>
+            <a:off x="1665543" y="2943497"/>
+            <a:ext cx="8264434" cy="296092"/>
+          </a:xfrm>
+          <a:prstGeom prst="rect">
+            <a:avLst/>
+          </a:prstGeom>
+          <a:solidFill>
+            <a:schemeClr val="accent2">
+              <a:alpha val="75000"/>
+            </a:schemeClr>
+          </a:solidFill>
+          <a:ln>
+            <a:noFill/>
+          </a:ln>
+        </p:spPr>
+        <p:style>
+          <a:lnRef idx="2">
+            <a:schemeClr val="accent3">
+              <a:shade val="50000"/>
+            </a:schemeClr>
+          </a:lnRef>
+          <a:fillRef idx="1">
+            <a:schemeClr val="accent3"/>
+          </a:fillRef>
+          <a:effectRef idx="0">
+            <a:schemeClr val="accent3"/>
+          </a:effectRef>
+          <a:fontRef idx="minor">
+            <a:schemeClr val="lt1"/>
+          </a:fontRef>
+        </p:style>
+        <p:txBody>
+          <a:bodyPr rtlCol="0" anchor="ctr"/>
+          <a:lstStyle/>
+          <a:p>
+            <a:pPr algn="ctr"/>
+            <a:r>
+              <a:rPr lang="en-US"/>
+              <a:t>TweetAuthorInfo (blank)</a:t>
+            </a:r>
+          </a:p>
+        </p:txBody>
+      </p:sp>
+      <p:sp>
+        <p:nvSpPr>
+          <p:cNvPr id="8" name="Rectangle 7">
+            <a:extLst>
+              <a:ext uri="{FF2B5EF4-FFF2-40B4-BE49-F238E27FC236}">
+                <a16:creationId xmlns:a16="http://schemas.microsoft.com/office/drawing/2014/main" id="{BBCFC1A0-D4F1-0A4A-79FA-837E9EA3673B}"/>
+              </a:ext>
+            </a:extLst>
+          </p:cNvPr>
+          <p:cNvSpPr/>
+          <p:nvPr/>
+        </p:nvSpPr>
+        <p:spPr>
+          <a:xfrm>
+            <a:off x="1665543" y="3239588"/>
+            <a:ext cx="8264434" cy="775063"/>
+          </a:xfrm>
+          <a:prstGeom prst="rect">
+            <a:avLst/>
+          </a:prstGeom>
+          <a:solidFill>
+            <a:schemeClr val="accent2">
+              <a:alpha val="75000"/>
+            </a:schemeClr>
+          </a:solidFill>
+          <a:ln>
+            <a:noFill/>
+          </a:ln>
+        </p:spPr>
+        <p:style>
+          <a:lnRef idx="2">
+            <a:schemeClr val="accent3">
+              <a:shade val="50000"/>
+            </a:schemeClr>
+          </a:lnRef>
+          <a:fillRef idx="1">
+            <a:schemeClr val="accent3"/>
+          </a:fillRef>
+          <a:effectRef idx="0">
+            <a:schemeClr val="accent3"/>
+          </a:effectRef>
+          <a:fontRef idx="minor">
+            <a:schemeClr val="lt1"/>
+          </a:fontRef>
+        </p:style>
+        <p:txBody>
+          <a:bodyPr rtlCol="0" anchor="ctr"/>
+          <a:lstStyle/>
+          <a:p>
+            <a:pPr algn="ctr"/>
+            <a:r>
+              <a:rPr lang="en-US"/>
+              <a:t>TweetContent (as a form)</a:t>
+            </a:r>
+          </a:p>
+        </p:txBody>
+      </p:sp>
+      <p:sp>
+        <p:nvSpPr>
+          <p:cNvPr id="9" name="Rectangle 8">
+            <a:extLst>
+              <a:ext uri="{FF2B5EF4-FFF2-40B4-BE49-F238E27FC236}">
+                <a16:creationId xmlns:a16="http://schemas.microsoft.com/office/drawing/2014/main" id="{B2920B99-DB82-814C-CC8C-F7F03A9798AE}"/>
+              </a:ext>
+            </a:extLst>
+          </p:cNvPr>
+          <p:cNvSpPr/>
+          <p:nvPr/>
+        </p:nvSpPr>
+        <p:spPr>
+          <a:xfrm>
+            <a:off x="1665543" y="4010297"/>
+            <a:ext cx="8264434" cy="775063"/>
+          </a:xfrm>
+          <a:prstGeom prst="rect">
+            <a:avLst/>
+          </a:prstGeom>
+          <a:solidFill>
+            <a:schemeClr val="accent2">
+              <a:alpha val="75000"/>
+            </a:schemeClr>
+          </a:solidFill>
+          <a:ln>
+            <a:noFill/>
+          </a:ln>
+        </p:spPr>
+        <p:style>
+          <a:lnRef idx="2">
+            <a:schemeClr val="accent3">
+              <a:shade val="50000"/>
+            </a:schemeClr>
+          </a:lnRef>
+          <a:fillRef idx="1">
+            <a:schemeClr val="accent3"/>
+          </a:fillRef>
+          <a:effectRef idx="0">
+            <a:schemeClr val="accent3"/>
+          </a:effectRef>
+          <a:fontRef idx="minor">
+            <a:schemeClr val="lt1"/>
+          </a:fontRef>
+        </p:style>
+        <p:txBody>
+          <a:bodyPr rtlCol="0" anchor="ctr"/>
+          <a:lstStyle/>
+          <a:p>
+            <a:pPr algn="ctr"/>
+            <a:r>
+              <a:rPr lang="en-US"/>
+              <a:t>TweetActionsNew</a:t>
+            </a:r>
+          </a:p>
+        </p:txBody>
+      </p:sp>
+      <p:sp>
+        <p:nvSpPr>
+          <p:cNvPr id="10" name="Rectangle 9">
+            <a:extLst>
+              <a:ext uri="{FF2B5EF4-FFF2-40B4-BE49-F238E27FC236}">
+                <a16:creationId xmlns:a16="http://schemas.microsoft.com/office/drawing/2014/main" id="{5F578342-0C0B-A94C-00D0-7C58485C5D74}"/>
+              </a:ext>
+            </a:extLst>
+          </p:cNvPr>
+          <p:cNvSpPr/>
+          <p:nvPr/>
+        </p:nvSpPr>
+        <p:spPr>
+          <a:xfrm>
+            <a:off x="10154194" y="3196045"/>
+            <a:ext cx="1776549" cy="775063"/>
+          </a:xfrm>
+          <a:prstGeom prst="rect">
+            <a:avLst/>
+          </a:prstGeom>
+          <a:solidFill>
+            <a:schemeClr val="tx1">
+              <a:lumMod val="65000"/>
+              <a:lumOff val="35000"/>
+            </a:schemeClr>
+          </a:solidFill>
+          <a:ln>
+            <a:noFill/>
+          </a:ln>
+        </p:spPr>
+        <p:style>
+          <a:lnRef idx="2">
+            <a:schemeClr val="accent3">
+              <a:shade val="50000"/>
+            </a:schemeClr>
+          </a:lnRef>
+          <a:fillRef idx="1">
+            <a:schemeClr val="accent3"/>
+          </a:fillRef>
+          <a:effectRef idx="0">
+            <a:schemeClr val="accent3"/>
+          </a:effectRef>
+          <a:fontRef idx="minor">
+            <a:schemeClr val="lt1"/>
+          </a:fontRef>
+        </p:style>
+        <p:txBody>
+          <a:bodyPr rtlCol="0" anchor="ctr"/>
+          <a:lstStyle/>
+          <a:p>
+            <a:pPr algn="ctr"/>
+            <a:r>
+              <a:rPr lang="en-US"/>
+              <a:t>Min-height</a:t>
+            </a:r>
+          </a:p>
+        </p:txBody>
+      </p:sp>
+      <p:sp>
+        <p:nvSpPr>
+          <p:cNvPr id="11" name="Rectangle 10">
+            <a:extLst>
+              <a:ext uri="{FF2B5EF4-FFF2-40B4-BE49-F238E27FC236}">
+                <a16:creationId xmlns:a16="http://schemas.microsoft.com/office/drawing/2014/main" id="{1FC776DB-0D12-DC15-3E59-BC73CCDEBAFB}"/>
+              </a:ext>
+            </a:extLst>
+          </p:cNvPr>
+          <p:cNvSpPr/>
+          <p:nvPr/>
+        </p:nvSpPr>
+        <p:spPr>
+          <a:xfrm>
+            <a:off x="10049691" y="4302033"/>
+            <a:ext cx="1776549" cy="775063"/>
+          </a:xfrm>
+          <a:prstGeom prst="rect">
+            <a:avLst/>
+          </a:prstGeom>
+          <a:solidFill>
+            <a:schemeClr val="tx1">
+              <a:lumMod val="65000"/>
+              <a:lumOff val="35000"/>
+            </a:schemeClr>
+          </a:solidFill>
+          <a:ln>
+            <a:noFill/>
+          </a:ln>
+        </p:spPr>
+        <p:style>
+          <a:lnRef idx="2">
+            <a:schemeClr val="accent3">
+              <a:shade val="50000"/>
+            </a:schemeClr>
+          </a:lnRef>
+          <a:fillRef idx="1">
+            <a:schemeClr val="accent3"/>
+          </a:fillRef>
+          <a:effectRef idx="0">
+            <a:schemeClr val="accent3"/>
+          </a:effectRef>
+          <a:fontRef idx="minor">
+            <a:schemeClr val="lt1"/>
+          </a:fontRef>
+        </p:style>
+        <p:txBody>
+          <a:bodyPr rtlCol="0" anchor="ctr"/>
+          <a:lstStyle/>
+          <a:p>
+            <a:pPr algn="ctr"/>
+            <a:r>
+              <a:rPr lang="en-US"/>
+              <a:t>Padding (no height)</a:t>
+            </a:r>
+          </a:p>
+        </p:txBody>
+      </p:sp>
+    </p:spTree>
+    <p:extLst>
+      <p:ext uri="{BB962C8B-B14F-4D97-AF65-F5344CB8AC3E}">
+        <p14:creationId xmlns:p14="http://schemas.microsoft.com/office/powerpoint/2010/main" val="3531458181"/>
+      </p:ext>
+    </p:extLst>
+  </p:cSld>
+  <p:clrMapOvr>
+    <a:masterClrMapping/>
+  </p:clrMapOvr>
+</p:sld>
+</file>
+
+<file path=ppt/slides/slide24.xml><?xml version="1.0" encoding="utf-8"?>
+<p:sld xmlns:a="http://schemas.openxmlformats.org/drawingml/2006/main" xmlns:r="http://schemas.openxmlformats.org/officeDocument/2006/relationships" xmlns:p="http://schemas.openxmlformats.org/presentationml/2006/main">
+  <p:cSld>
+    <p:spTree>
+      <p:nvGrpSpPr>
+        <p:cNvPr id="1" name=""/>
+        <p:cNvGrpSpPr/>
+        <p:nvPr/>
+      </p:nvGrpSpPr>
+      <p:grpSpPr>
+        <a:xfrm>
+          <a:off x="0" y="0"/>
+          <a:ext cx="0" cy="0"/>
+          <a:chOff x="0" y="0"/>
+          <a:chExt cx="0" cy="0"/>
+        </a:xfrm>
+      </p:grpSpPr>
+      <p:pic>
+        <p:nvPicPr>
+          <p:cNvPr id="2" name="Picture 1">
+            <a:extLst>
+              <a:ext uri="{FF2B5EF4-FFF2-40B4-BE49-F238E27FC236}">
                 <a16:creationId xmlns:a16="http://schemas.microsoft.com/office/drawing/2014/main" id="{EDAA2B87-EBEA-6340-2724-B2C5BFEE0A7D}"/>
               </a:ext>
             </a:extLst>
@@ -12272,7 +12761,7 @@
 </p:sld>
 </file>
 
-<file path=ppt/slides/slide24.xml><?xml version="1.0" encoding="utf-8"?>
+<file path=ppt/slides/slide25.xml><?xml version="1.0" encoding="utf-8"?>
 <p:sld xmlns:a="http://schemas.openxmlformats.org/drawingml/2006/main" xmlns:r="http://schemas.openxmlformats.org/officeDocument/2006/relationships" xmlns:p="http://schemas.openxmlformats.org/presentationml/2006/main">
   <p:cSld>
     <p:spTree>
@@ -12930,7 +13419,7 @@
 </p:sld>
 </file>
 
-<file path=ppt/slides/slide25.xml><?xml version="1.0" encoding="utf-8"?>
+<file path=ppt/slides/slide26.xml><?xml version="1.0" encoding="utf-8"?>
 <p:sld xmlns:a="http://schemas.openxmlformats.org/drawingml/2006/main" xmlns:r="http://schemas.openxmlformats.org/officeDocument/2006/relationships" xmlns:p="http://schemas.openxmlformats.org/presentationml/2006/main">
   <p:cSld>
     <p:spTree>
@@ -13609,495 +14098,6 @@
     <p:extLst>
       <p:ext uri="{BB962C8B-B14F-4D97-AF65-F5344CB8AC3E}">
         <p14:creationId xmlns:p14="http://schemas.microsoft.com/office/powerpoint/2010/main" val="1396319845"/>
-      </p:ext>
-    </p:extLst>
-  </p:cSld>
-  <p:clrMapOvr>
-    <a:masterClrMapping/>
-  </p:clrMapOvr>
-</p:sld>
-</file>
-
-<file path=ppt/slides/slide26.xml><?xml version="1.0" encoding="utf-8"?>
-<p:sld xmlns:a="http://schemas.openxmlformats.org/drawingml/2006/main" xmlns:r="http://schemas.openxmlformats.org/officeDocument/2006/relationships" xmlns:p="http://schemas.openxmlformats.org/presentationml/2006/main">
-  <p:cSld>
-    <p:spTree>
-      <p:nvGrpSpPr>
-        <p:cNvPr id="1" name=""/>
-        <p:cNvGrpSpPr/>
-        <p:nvPr/>
-      </p:nvGrpSpPr>
-      <p:grpSpPr>
-        <a:xfrm>
-          <a:off x="0" y="0"/>
-          <a:ext cx="0" cy="0"/>
-          <a:chOff x="0" y="0"/>
-          <a:chExt cx="0" cy="0"/>
-        </a:xfrm>
-      </p:grpSpPr>
-      <p:pic>
-        <p:nvPicPr>
-          <p:cNvPr id="2" name="Picture 1">
-            <a:extLst>
-              <a:ext uri="{FF2B5EF4-FFF2-40B4-BE49-F238E27FC236}">
-                <a16:creationId xmlns:a16="http://schemas.microsoft.com/office/drawing/2014/main" id="{06F21E62-7134-D042-9A94-3AA6F9DE5ED8}"/>
-              </a:ext>
-            </a:extLst>
-          </p:cNvPr>
-          <p:cNvPicPr>
-            <a:picLocks noChangeAspect="1"/>
-          </p:cNvPicPr>
-          <p:nvPr/>
-        </p:nvPicPr>
-        <p:blipFill rotWithShape="1">
-          <a:blip r:embed="rId2"/>
-          <a:srcRect b="72054"/>
-          <a:stretch/>
-        </p:blipFill>
-        <p:spPr>
-          <a:xfrm>
-            <a:off x="878486" y="536350"/>
-            <a:ext cx="9867164" cy="2119764"/>
-          </a:xfrm>
-          <a:prstGeom prst="rect">
-            <a:avLst/>
-          </a:prstGeom>
-        </p:spPr>
-      </p:pic>
-      <p:sp>
-        <p:nvSpPr>
-          <p:cNvPr id="3" name="Rectangle 2">
-            <a:extLst>
-              <a:ext uri="{FF2B5EF4-FFF2-40B4-BE49-F238E27FC236}">
-                <a16:creationId xmlns:a16="http://schemas.microsoft.com/office/drawing/2014/main" id="{B0D25E31-B7D9-BC3B-6D03-157FE503CBEB}"/>
-              </a:ext>
-            </a:extLst>
-          </p:cNvPr>
-          <p:cNvSpPr/>
-          <p:nvPr/>
-        </p:nvSpPr>
-        <p:spPr>
-          <a:xfrm>
-            <a:off x="1150071" y="705394"/>
-            <a:ext cx="891606" cy="844732"/>
-          </a:xfrm>
-          <a:prstGeom prst="rect">
-            <a:avLst/>
-          </a:prstGeom>
-          <a:solidFill>
-            <a:schemeClr val="accent2">
-              <a:alpha val="75000"/>
-            </a:schemeClr>
-          </a:solidFill>
-          <a:ln>
-            <a:noFill/>
-          </a:ln>
-        </p:spPr>
-        <p:style>
-          <a:lnRef idx="2">
-            <a:schemeClr val="accent3">
-              <a:shade val="50000"/>
-            </a:schemeClr>
-          </a:lnRef>
-          <a:fillRef idx="1">
-            <a:schemeClr val="accent3"/>
-          </a:fillRef>
-          <a:effectRef idx="0">
-            <a:schemeClr val="accent3"/>
-          </a:effectRef>
-          <a:fontRef idx="minor">
-            <a:schemeClr val="lt1"/>
-          </a:fontRef>
-        </p:style>
-        <p:txBody>
-          <a:bodyPr rtlCol="0" anchor="ctr"/>
-          <a:lstStyle/>
-          <a:p>
-            <a:pPr algn="ctr"/>
-            <a:r>
-              <a:rPr lang="en-US"/>
-              <a:t>TweetProfilePic</a:t>
-            </a:r>
-          </a:p>
-        </p:txBody>
-      </p:sp>
-      <p:sp>
-        <p:nvSpPr>
-          <p:cNvPr id="4" name="Rectangle 3">
-            <a:extLst>
-              <a:ext uri="{FF2B5EF4-FFF2-40B4-BE49-F238E27FC236}">
-                <a16:creationId xmlns:a16="http://schemas.microsoft.com/office/drawing/2014/main" id="{826F883C-00F6-88F1-A88C-A9D7C338A121}"/>
-              </a:ext>
-            </a:extLst>
-          </p:cNvPr>
-          <p:cNvSpPr/>
-          <p:nvPr/>
-        </p:nvSpPr>
-        <p:spPr>
-          <a:xfrm>
-            <a:off x="2041678" y="705393"/>
-            <a:ext cx="8539236" cy="1854927"/>
-          </a:xfrm>
-          <a:prstGeom prst="rect">
-            <a:avLst/>
-          </a:prstGeom>
-          <a:solidFill>
-            <a:schemeClr val="accent2">
-              <a:alpha val="75000"/>
-            </a:schemeClr>
-          </a:solidFill>
-          <a:ln>
-            <a:noFill/>
-          </a:ln>
-        </p:spPr>
-        <p:style>
-          <a:lnRef idx="2">
-            <a:schemeClr val="accent3">
-              <a:shade val="50000"/>
-            </a:schemeClr>
-          </a:lnRef>
-          <a:fillRef idx="1">
-            <a:schemeClr val="accent3"/>
-          </a:fillRef>
-          <a:effectRef idx="0">
-            <a:schemeClr val="accent3"/>
-          </a:effectRef>
-          <a:fontRef idx="minor">
-            <a:schemeClr val="lt1"/>
-          </a:fontRef>
-        </p:style>
-        <p:txBody>
-          <a:bodyPr rtlCol="0" anchor="ctr"/>
-          <a:lstStyle/>
-          <a:p>
-            <a:pPr algn="ctr"/>
-            <a:r>
-              <a:rPr lang="en-US"/>
-              <a:t>TweetRight</a:t>
-            </a:r>
-          </a:p>
-        </p:txBody>
-      </p:sp>
-      <p:pic>
-        <p:nvPicPr>
-          <p:cNvPr id="5" name="Picture 4">
-            <a:extLst>
-              <a:ext uri="{FF2B5EF4-FFF2-40B4-BE49-F238E27FC236}">
-                <a16:creationId xmlns:a16="http://schemas.microsoft.com/office/drawing/2014/main" id="{0DACCA06-C349-1A5F-A7DA-2996A7212478}"/>
-              </a:ext>
-            </a:extLst>
-          </p:cNvPr>
-          <p:cNvPicPr>
-            <a:picLocks noChangeAspect="1"/>
-          </p:cNvPicPr>
-          <p:nvPr/>
-        </p:nvPicPr>
-        <p:blipFill rotWithShape="1">
-          <a:blip r:embed="rId2"/>
-          <a:srcRect l="12624" t="1631" r="3619" b="74144"/>
-          <a:stretch/>
-        </p:blipFill>
-        <p:spPr>
-          <a:xfrm>
-            <a:off x="1665543" y="2943496"/>
-            <a:ext cx="8264434" cy="1837510"/>
-          </a:xfrm>
-          <a:prstGeom prst="rect">
-            <a:avLst/>
-          </a:prstGeom>
-        </p:spPr>
-      </p:pic>
-      <p:sp>
-        <p:nvSpPr>
-          <p:cNvPr id="7" name="Rectangle 6">
-            <a:extLst>
-              <a:ext uri="{FF2B5EF4-FFF2-40B4-BE49-F238E27FC236}">
-                <a16:creationId xmlns:a16="http://schemas.microsoft.com/office/drawing/2014/main" id="{8D1B362A-D50F-D62C-15AF-75284CDDF32E}"/>
-              </a:ext>
-            </a:extLst>
-          </p:cNvPr>
-          <p:cNvSpPr/>
-          <p:nvPr/>
-        </p:nvSpPr>
-        <p:spPr>
-          <a:xfrm>
-            <a:off x="1665543" y="2943497"/>
-            <a:ext cx="8264434" cy="296092"/>
-          </a:xfrm>
-          <a:prstGeom prst="rect">
-            <a:avLst/>
-          </a:prstGeom>
-          <a:solidFill>
-            <a:schemeClr val="accent2">
-              <a:alpha val="75000"/>
-            </a:schemeClr>
-          </a:solidFill>
-          <a:ln>
-            <a:noFill/>
-          </a:ln>
-        </p:spPr>
-        <p:style>
-          <a:lnRef idx="2">
-            <a:schemeClr val="accent3">
-              <a:shade val="50000"/>
-            </a:schemeClr>
-          </a:lnRef>
-          <a:fillRef idx="1">
-            <a:schemeClr val="accent3"/>
-          </a:fillRef>
-          <a:effectRef idx="0">
-            <a:schemeClr val="accent3"/>
-          </a:effectRef>
-          <a:fontRef idx="minor">
-            <a:schemeClr val="lt1"/>
-          </a:fontRef>
-        </p:style>
-        <p:txBody>
-          <a:bodyPr rtlCol="0" anchor="ctr"/>
-          <a:lstStyle/>
-          <a:p>
-            <a:pPr algn="ctr"/>
-            <a:r>
-              <a:rPr lang="en-US"/>
-              <a:t>TweetAuthorInfo (blank)</a:t>
-            </a:r>
-          </a:p>
-        </p:txBody>
-      </p:sp>
-      <p:sp>
-        <p:nvSpPr>
-          <p:cNvPr id="8" name="Rectangle 7">
-            <a:extLst>
-              <a:ext uri="{FF2B5EF4-FFF2-40B4-BE49-F238E27FC236}">
-                <a16:creationId xmlns:a16="http://schemas.microsoft.com/office/drawing/2014/main" id="{BBCFC1A0-D4F1-0A4A-79FA-837E9EA3673B}"/>
-              </a:ext>
-            </a:extLst>
-          </p:cNvPr>
-          <p:cNvSpPr/>
-          <p:nvPr/>
-        </p:nvSpPr>
-        <p:spPr>
-          <a:xfrm>
-            <a:off x="1665543" y="3239588"/>
-            <a:ext cx="8264434" cy="775063"/>
-          </a:xfrm>
-          <a:prstGeom prst="rect">
-            <a:avLst/>
-          </a:prstGeom>
-          <a:solidFill>
-            <a:schemeClr val="accent2">
-              <a:alpha val="75000"/>
-            </a:schemeClr>
-          </a:solidFill>
-          <a:ln>
-            <a:noFill/>
-          </a:ln>
-        </p:spPr>
-        <p:style>
-          <a:lnRef idx="2">
-            <a:schemeClr val="accent3">
-              <a:shade val="50000"/>
-            </a:schemeClr>
-          </a:lnRef>
-          <a:fillRef idx="1">
-            <a:schemeClr val="accent3"/>
-          </a:fillRef>
-          <a:effectRef idx="0">
-            <a:schemeClr val="accent3"/>
-          </a:effectRef>
-          <a:fontRef idx="minor">
-            <a:schemeClr val="lt1"/>
-          </a:fontRef>
-        </p:style>
-        <p:txBody>
-          <a:bodyPr rtlCol="0" anchor="ctr"/>
-          <a:lstStyle/>
-          <a:p>
-            <a:pPr algn="ctr"/>
-            <a:r>
-              <a:rPr lang="en-US"/>
-              <a:t>TweetContent (as a form)</a:t>
-            </a:r>
-          </a:p>
-        </p:txBody>
-      </p:sp>
-      <p:sp>
-        <p:nvSpPr>
-          <p:cNvPr id="9" name="Rectangle 8">
-            <a:extLst>
-              <a:ext uri="{FF2B5EF4-FFF2-40B4-BE49-F238E27FC236}">
-                <a16:creationId xmlns:a16="http://schemas.microsoft.com/office/drawing/2014/main" id="{B2920B99-DB82-814C-CC8C-F7F03A9798AE}"/>
-              </a:ext>
-            </a:extLst>
-          </p:cNvPr>
-          <p:cNvSpPr/>
-          <p:nvPr/>
-        </p:nvSpPr>
-        <p:spPr>
-          <a:xfrm>
-            <a:off x="1665543" y="4010297"/>
-            <a:ext cx="8264434" cy="775063"/>
-          </a:xfrm>
-          <a:prstGeom prst="rect">
-            <a:avLst/>
-          </a:prstGeom>
-          <a:solidFill>
-            <a:schemeClr val="accent2">
-              <a:alpha val="75000"/>
-            </a:schemeClr>
-          </a:solidFill>
-          <a:ln>
-            <a:noFill/>
-          </a:ln>
-        </p:spPr>
-        <p:style>
-          <a:lnRef idx="2">
-            <a:schemeClr val="accent3">
-              <a:shade val="50000"/>
-            </a:schemeClr>
-          </a:lnRef>
-          <a:fillRef idx="1">
-            <a:schemeClr val="accent3"/>
-          </a:fillRef>
-          <a:effectRef idx="0">
-            <a:schemeClr val="accent3"/>
-          </a:effectRef>
-          <a:fontRef idx="minor">
-            <a:schemeClr val="lt1"/>
-          </a:fontRef>
-        </p:style>
-        <p:txBody>
-          <a:bodyPr rtlCol="0" anchor="ctr"/>
-          <a:lstStyle/>
-          <a:p>
-            <a:pPr algn="ctr"/>
-            <a:r>
-              <a:rPr lang="en-US"/>
-              <a:t>TweetActionsNew</a:t>
-            </a:r>
-          </a:p>
-        </p:txBody>
-      </p:sp>
-      <p:sp>
-        <p:nvSpPr>
-          <p:cNvPr id="10" name="Rectangle 9">
-            <a:extLst>
-              <a:ext uri="{FF2B5EF4-FFF2-40B4-BE49-F238E27FC236}">
-                <a16:creationId xmlns:a16="http://schemas.microsoft.com/office/drawing/2014/main" id="{5F578342-0C0B-A94C-00D0-7C58485C5D74}"/>
-              </a:ext>
-            </a:extLst>
-          </p:cNvPr>
-          <p:cNvSpPr/>
-          <p:nvPr/>
-        </p:nvSpPr>
-        <p:spPr>
-          <a:xfrm>
-            <a:off x="10154194" y="3196045"/>
-            <a:ext cx="1776549" cy="775063"/>
-          </a:xfrm>
-          <a:prstGeom prst="rect">
-            <a:avLst/>
-          </a:prstGeom>
-          <a:solidFill>
-            <a:schemeClr val="tx1">
-              <a:lumMod val="65000"/>
-              <a:lumOff val="35000"/>
-            </a:schemeClr>
-          </a:solidFill>
-          <a:ln>
-            <a:noFill/>
-          </a:ln>
-        </p:spPr>
-        <p:style>
-          <a:lnRef idx="2">
-            <a:schemeClr val="accent3">
-              <a:shade val="50000"/>
-            </a:schemeClr>
-          </a:lnRef>
-          <a:fillRef idx="1">
-            <a:schemeClr val="accent3"/>
-          </a:fillRef>
-          <a:effectRef idx="0">
-            <a:schemeClr val="accent3"/>
-          </a:effectRef>
-          <a:fontRef idx="minor">
-            <a:schemeClr val="lt1"/>
-          </a:fontRef>
-        </p:style>
-        <p:txBody>
-          <a:bodyPr rtlCol="0" anchor="ctr"/>
-          <a:lstStyle/>
-          <a:p>
-            <a:pPr algn="ctr"/>
-            <a:r>
-              <a:rPr lang="en-US"/>
-              <a:t>Min-height</a:t>
-            </a:r>
-          </a:p>
-        </p:txBody>
-      </p:sp>
-      <p:sp>
-        <p:nvSpPr>
-          <p:cNvPr id="11" name="Rectangle 10">
-            <a:extLst>
-              <a:ext uri="{FF2B5EF4-FFF2-40B4-BE49-F238E27FC236}">
-                <a16:creationId xmlns:a16="http://schemas.microsoft.com/office/drawing/2014/main" id="{1FC776DB-0D12-DC15-3E59-BC73CCDEBAFB}"/>
-              </a:ext>
-            </a:extLst>
-          </p:cNvPr>
-          <p:cNvSpPr/>
-          <p:nvPr/>
-        </p:nvSpPr>
-        <p:spPr>
-          <a:xfrm>
-            <a:off x="10049691" y="4302033"/>
-            <a:ext cx="1776549" cy="775063"/>
-          </a:xfrm>
-          <a:prstGeom prst="rect">
-            <a:avLst/>
-          </a:prstGeom>
-          <a:solidFill>
-            <a:schemeClr val="tx1">
-              <a:lumMod val="65000"/>
-              <a:lumOff val="35000"/>
-            </a:schemeClr>
-          </a:solidFill>
-          <a:ln>
-            <a:noFill/>
-          </a:ln>
-        </p:spPr>
-        <p:style>
-          <a:lnRef idx="2">
-            <a:schemeClr val="accent3">
-              <a:shade val="50000"/>
-            </a:schemeClr>
-          </a:lnRef>
-          <a:fillRef idx="1">
-            <a:schemeClr val="accent3"/>
-          </a:fillRef>
-          <a:effectRef idx="0">
-            <a:schemeClr val="accent3"/>
-          </a:effectRef>
-          <a:fontRef idx="minor">
-            <a:schemeClr val="lt1"/>
-          </a:fontRef>
-        </p:style>
-        <p:txBody>
-          <a:bodyPr rtlCol="0" anchor="ctr"/>
-          <a:lstStyle/>
-          <a:p>
-            <a:pPr algn="ctr"/>
-            <a:r>
-              <a:rPr lang="en-US"/>
-              <a:t>Padding (no height)</a:t>
-            </a:r>
-          </a:p>
-        </p:txBody>
-      </p:sp>
-    </p:spTree>
-    <p:extLst>
-      <p:ext uri="{BB962C8B-B14F-4D97-AF65-F5344CB8AC3E}">
-        <p14:creationId xmlns:p14="http://schemas.microsoft.com/office/powerpoint/2010/main" val="3531458181"/>
       </p:ext>
     </p:extLst>
   </p:cSld>

</xml_diff>

<commit_message>
Start work on Feed UI
</commit_message>
<xml_diff>
--- a/Twitter Clone.pptx
+++ b/Twitter Clone.pptx
@@ -204,7 +204,7 @@
   <pc:docChgLst>
     <pc:chgData name="Matt Burns" userId="a4ff0c107545f849" providerId="LiveId" clId="{8892E39A-8B6A-49A3-908D-D8571AC1E7B7}"/>
     <pc:docChg chg="undo custSel addSld delSld modSld sldOrd modSection">
-      <pc:chgData name="Matt Burns" userId="a4ff0c107545f849" providerId="LiveId" clId="{8892E39A-8B6A-49A3-908D-D8571AC1E7B7}" dt="2023-03-15T17:50:02.681" v="2095"/>
+      <pc:chgData name="Matt Burns" userId="a4ff0c107545f849" providerId="LiveId" clId="{8892E39A-8B6A-49A3-908D-D8571AC1E7B7}" dt="2023-03-15T22:07:59.903" v="2096" actId="14100"/>
       <pc:docMkLst>
         <pc:docMk/>
       </pc:docMkLst>
@@ -1692,7 +1692,7 @@
         </pc:picChg>
       </pc:sldChg>
       <pc:sldChg chg="addSp delSp modSp new mod ord">
-        <pc:chgData name="Matt Burns" userId="a4ff0c107545f849" providerId="LiveId" clId="{8892E39A-8B6A-49A3-908D-D8571AC1E7B7}" dt="2023-03-15T17:50:02.681" v="2095"/>
+        <pc:chgData name="Matt Burns" userId="a4ff0c107545f849" providerId="LiveId" clId="{8892E39A-8B6A-49A3-908D-D8571AC1E7B7}" dt="2023-03-15T22:07:59.903" v="2096" actId="14100"/>
         <pc:sldMkLst>
           <pc:docMk/>
           <pc:sldMk cId="3531458181" sldId="287"/>
@@ -1730,7 +1730,7 @@
           </ac:spMkLst>
         </pc:spChg>
         <pc:spChg chg="add mod">
-          <ac:chgData name="Matt Burns" userId="a4ff0c107545f849" providerId="LiveId" clId="{8892E39A-8B6A-49A3-908D-D8571AC1E7B7}" dt="2023-03-13T15:46:28.977" v="1743" actId="1076"/>
+          <ac:chgData name="Matt Burns" userId="a4ff0c107545f849" providerId="LiveId" clId="{8892E39A-8B6A-49A3-908D-D8571AC1E7B7}" dt="2023-03-15T22:07:59.903" v="2096" actId="14100"/>
           <ac:spMkLst>
             <pc:docMk/>
             <pc:sldMk cId="3531458181" sldId="287"/>
@@ -12045,7 +12045,7 @@
         <p:spPr>
           <a:xfrm>
             <a:off x="1665543" y="3239588"/>
-            <a:ext cx="8264434" cy="775063"/>
+            <a:ext cx="8122891" cy="775063"/>
           </a:xfrm>
           <a:prstGeom prst="rect">
             <a:avLst/>

</xml_diff>